<commit_message>
kind of getting all of the message
</commit_message>
<xml_diff>
--- a/HuanQinEyE project.pptx
+++ b/HuanQinEyE project.pptx
@@ -69,7 +69,7 @@
         <p:spPr>
           <a:xfrm>
             <a:off x="504000" y="301320"/>
-            <a:ext cx="9071280" cy="1261800"/>
+            <a:ext cx="9072000" cy="1261800"/>
           </a:xfrm>
           <a:prstGeom prst="rect">
             <a:avLst/>
@@ -105,8 +105,8 @@
         </p:nvSpPr>
         <p:spPr>
           <a:xfrm>
-            <a:off x="504000" y="1769040"/>
-            <a:ext cx="9071280" cy="2090880"/>
+            <a:off x="504000" y="1768680"/>
+            <a:ext cx="9072000" cy="2090880"/>
           </a:xfrm>
           <a:prstGeom prst="rect">
             <a:avLst/>
@@ -141,8 +141,8 @@
         </p:nvSpPr>
         <p:spPr>
           <a:xfrm>
-            <a:off x="504000" y="4059000"/>
-            <a:ext cx="9071280" cy="2090880"/>
+            <a:off x="504000" y="4058640"/>
+            <a:ext cx="9072000" cy="2090880"/>
           </a:xfrm>
           <a:prstGeom prst="rect">
             <a:avLst/>
@@ -200,7 +200,7 @@
         <p:spPr>
           <a:xfrm>
             <a:off x="504000" y="301320"/>
-            <a:ext cx="9071280" cy="1261800"/>
+            <a:ext cx="9072000" cy="1261800"/>
           </a:xfrm>
           <a:prstGeom prst="rect">
             <a:avLst/>
@@ -236,8 +236,8 @@
         </p:nvSpPr>
         <p:spPr>
           <a:xfrm>
-            <a:off x="504000" y="1769040"/>
-            <a:ext cx="4426560" cy="2090880"/>
+            <a:off x="504000" y="1768680"/>
+            <a:ext cx="4426920" cy="2090880"/>
           </a:xfrm>
           <a:prstGeom prst="rect">
             <a:avLst/>
@@ -272,8 +272,8 @@
         </p:nvSpPr>
         <p:spPr>
           <a:xfrm>
-            <a:off x="5152320" y="1769040"/>
-            <a:ext cx="4426560" cy="2090880"/>
+            <a:off x="5152680" y="1768680"/>
+            <a:ext cx="4426920" cy="2090880"/>
           </a:xfrm>
           <a:prstGeom prst="rect">
             <a:avLst/>
@@ -308,8 +308,8 @@
         </p:nvSpPr>
         <p:spPr>
           <a:xfrm>
-            <a:off x="5152320" y="4059000"/>
-            <a:ext cx="4426560" cy="2090880"/>
+            <a:off x="5152680" y="4058640"/>
+            <a:ext cx="4426920" cy="2090880"/>
           </a:xfrm>
           <a:prstGeom prst="rect">
             <a:avLst/>
@@ -344,8 +344,8 @@
         </p:nvSpPr>
         <p:spPr>
           <a:xfrm>
-            <a:off x="504000" y="4059000"/>
-            <a:ext cx="4426560" cy="2090880"/>
+            <a:off x="504000" y="4058640"/>
+            <a:ext cx="4426920" cy="2090880"/>
           </a:xfrm>
           <a:prstGeom prst="rect">
             <a:avLst/>
@@ -403,7 +403,7 @@
         <p:spPr>
           <a:xfrm>
             <a:off x="504000" y="301320"/>
-            <a:ext cx="9071280" cy="1261800"/>
+            <a:ext cx="9072000" cy="1261800"/>
           </a:xfrm>
           <a:prstGeom prst="rect">
             <a:avLst/>
@@ -439,8 +439,8 @@
         </p:nvSpPr>
         <p:spPr>
           <a:xfrm>
-            <a:off x="504000" y="1769040"/>
-            <a:ext cx="9071280" cy="4384080"/>
+            <a:off x="504000" y="1768680"/>
+            <a:ext cx="9072000" cy="4384080"/>
           </a:xfrm>
           <a:prstGeom prst="rect">
             <a:avLst/>
@@ -475,8 +475,8 @@
         </p:nvSpPr>
         <p:spPr>
           <a:xfrm>
-            <a:off x="504000" y="1769040"/>
-            <a:ext cx="9071280" cy="4384080"/>
+            <a:off x="504000" y="1768680"/>
+            <a:ext cx="9072000" cy="4384080"/>
           </a:xfrm>
           <a:prstGeom prst="rect">
             <a:avLst/>
@@ -511,7 +511,7 @@
         </p:blipFill>
         <p:spPr>
           <a:xfrm>
-            <a:off x="2292120" y="1769040"/>
+            <a:off x="2292480" y="1768680"/>
             <a:ext cx="5494680" cy="4384080"/>
           </a:xfrm>
           <a:prstGeom prst="rect">
@@ -534,7 +534,7 @@
         </p:blipFill>
         <p:spPr>
           <a:xfrm>
-            <a:off x="2292120" y="1769040"/>
+            <a:off x="2292480" y="1768680"/>
             <a:ext cx="5494680" cy="4384080"/>
           </a:xfrm>
           <a:prstGeom prst="rect">
@@ -580,7 +580,7 @@
         <p:spPr>
           <a:xfrm>
             <a:off x="504000" y="301320"/>
-            <a:ext cx="9071280" cy="1261800"/>
+            <a:ext cx="9072000" cy="1261800"/>
           </a:xfrm>
           <a:prstGeom prst="rect">
             <a:avLst/>
@@ -616,8 +616,8 @@
         </p:nvSpPr>
         <p:spPr>
           <a:xfrm>
-            <a:off x="504000" y="1769040"/>
-            <a:ext cx="9071280" cy="4384080"/>
+            <a:off x="504000" y="1768680"/>
+            <a:ext cx="9072000" cy="4384080"/>
           </a:xfrm>
           <a:prstGeom prst="rect">
             <a:avLst/>
@@ -676,7 +676,7 @@
         <p:spPr>
           <a:xfrm>
             <a:off x="504000" y="301320"/>
-            <a:ext cx="9071280" cy="1261800"/>
+            <a:ext cx="9072000" cy="1261800"/>
           </a:xfrm>
           <a:prstGeom prst="rect">
             <a:avLst/>
@@ -712,8 +712,8 @@
         </p:nvSpPr>
         <p:spPr>
           <a:xfrm>
-            <a:off x="504000" y="1769040"/>
-            <a:ext cx="9071280" cy="4384080"/>
+            <a:off x="504000" y="1768680"/>
+            <a:ext cx="9072000" cy="4384080"/>
           </a:xfrm>
           <a:prstGeom prst="rect">
             <a:avLst/>
@@ -771,7 +771,7 @@
         <p:spPr>
           <a:xfrm>
             <a:off x="504000" y="301320"/>
-            <a:ext cx="9071280" cy="1261800"/>
+            <a:ext cx="9072000" cy="1261800"/>
           </a:xfrm>
           <a:prstGeom prst="rect">
             <a:avLst/>
@@ -807,8 +807,8 @@
         </p:nvSpPr>
         <p:spPr>
           <a:xfrm>
-            <a:off x="504000" y="1769040"/>
-            <a:ext cx="4426560" cy="4384080"/>
+            <a:off x="504000" y="1768680"/>
+            <a:ext cx="4426920" cy="4384080"/>
           </a:xfrm>
           <a:prstGeom prst="rect">
             <a:avLst/>
@@ -843,8 +843,8 @@
         </p:nvSpPr>
         <p:spPr>
           <a:xfrm>
-            <a:off x="5152320" y="1769040"/>
-            <a:ext cx="4426560" cy="4384080"/>
+            <a:off x="5152680" y="1768680"/>
+            <a:ext cx="4426920" cy="4384080"/>
           </a:xfrm>
           <a:prstGeom prst="rect">
             <a:avLst/>
@@ -902,7 +902,7 @@
         <p:spPr>
           <a:xfrm>
             <a:off x="504000" y="301320"/>
-            <a:ext cx="9071280" cy="1261800"/>
+            <a:ext cx="9072000" cy="1261800"/>
           </a:xfrm>
           <a:prstGeom prst="rect">
             <a:avLst/>
@@ -961,7 +961,7 @@
         <p:spPr>
           <a:xfrm>
             <a:off x="504000" y="301320"/>
-            <a:ext cx="9071280" cy="5850360"/>
+            <a:ext cx="9072000" cy="5850360"/>
           </a:xfrm>
           <a:prstGeom prst="rect">
             <a:avLst/>
@@ -1020,7 +1020,7 @@
         <p:spPr>
           <a:xfrm>
             <a:off x="504000" y="301320"/>
-            <a:ext cx="9071280" cy="1261800"/>
+            <a:ext cx="9072000" cy="1261800"/>
           </a:xfrm>
           <a:prstGeom prst="rect">
             <a:avLst/>
@@ -1056,8 +1056,8 @@
         </p:nvSpPr>
         <p:spPr>
           <a:xfrm>
-            <a:off x="504000" y="1769040"/>
-            <a:ext cx="4426560" cy="2090880"/>
+            <a:off x="504000" y="1768680"/>
+            <a:ext cx="4426920" cy="2090880"/>
           </a:xfrm>
           <a:prstGeom prst="rect">
             <a:avLst/>
@@ -1092,8 +1092,8 @@
         </p:nvSpPr>
         <p:spPr>
           <a:xfrm>
-            <a:off x="504000" y="4059000"/>
-            <a:ext cx="4426560" cy="2090880"/>
+            <a:off x="504000" y="4058640"/>
+            <a:ext cx="4426920" cy="2090880"/>
           </a:xfrm>
           <a:prstGeom prst="rect">
             <a:avLst/>
@@ -1128,8 +1128,8 @@
         </p:nvSpPr>
         <p:spPr>
           <a:xfrm>
-            <a:off x="5152320" y="1769040"/>
-            <a:ext cx="4426560" cy="4384080"/>
+            <a:off x="5152680" y="1768680"/>
+            <a:ext cx="4426920" cy="4384080"/>
           </a:xfrm>
           <a:prstGeom prst="rect">
             <a:avLst/>
@@ -1187,7 +1187,7 @@
         <p:spPr>
           <a:xfrm>
             <a:off x="504000" y="301320"/>
-            <a:ext cx="9071280" cy="1261800"/>
+            <a:ext cx="9072000" cy="1261800"/>
           </a:xfrm>
           <a:prstGeom prst="rect">
             <a:avLst/>
@@ -1223,8 +1223,8 @@
         </p:nvSpPr>
         <p:spPr>
           <a:xfrm>
-            <a:off x="504000" y="1769040"/>
-            <a:ext cx="4426560" cy="4384080"/>
+            <a:off x="504000" y="1768680"/>
+            <a:ext cx="4426920" cy="4384080"/>
           </a:xfrm>
           <a:prstGeom prst="rect">
             <a:avLst/>
@@ -1259,8 +1259,8 @@
         </p:nvSpPr>
         <p:spPr>
           <a:xfrm>
-            <a:off x="5152320" y="1769040"/>
-            <a:ext cx="4426560" cy="2090880"/>
+            <a:off x="5152680" y="1768680"/>
+            <a:ext cx="4426920" cy="2090880"/>
           </a:xfrm>
           <a:prstGeom prst="rect">
             <a:avLst/>
@@ -1295,8 +1295,8 @@
         </p:nvSpPr>
         <p:spPr>
           <a:xfrm>
-            <a:off x="5152320" y="4059000"/>
-            <a:ext cx="4426560" cy="2090880"/>
+            <a:off x="5152680" y="4058640"/>
+            <a:ext cx="4426920" cy="2090880"/>
           </a:xfrm>
           <a:prstGeom prst="rect">
             <a:avLst/>
@@ -1354,7 +1354,7 @@
         <p:spPr>
           <a:xfrm>
             <a:off x="504000" y="301320"/>
-            <a:ext cx="9071280" cy="1261800"/>
+            <a:ext cx="9072000" cy="1261800"/>
           </a:xfrm>
           <a:prstGeom prst="rect">
             <a:avLst/>
@@ -1390,8 +1390,8 @@
         </p:nvSpPr>
         <p:spPr>
           <a:xfrm>
-            <a:off x="504000" y="1769040"/>
-            <a:ext cx="4426560" cy="2090880"/>
+            <a:off x="504000" y="1768680"/>
+            <a:ext cx="4426920" cy="2090880"/>
           </a:xfrm>
           <a:prstGeom prst="rect">
             <a:avLst/>
@@ -1426,8 +1426,8 @@
         </p:nvSpPr>
         <p:spPr>
           <a:xfrm>
-            <a:off x="5152320" y="1769040"/>
-            <a:ext cx="4426560" cy="2090880"/>
+            <a:off x="5152680" y="1768680"/>
+            <a:ext cx="4426920" cy="2090880"/>
           </a:xfrm>
           <a:prstGeom prst="rect">
             <a:avLst/>
@@ -1462,8 +1462,8 @@
         </p:nvSpPr>
         <p:spPr>
           <a:xfrm>
-            <a:off x="504000" y="4059000"/>
-            <a:ext cx="9071280" cy="2090880"/>
+            <a:off x="504000" y="4058640"/>
+            <a:ext cx="9072000" cy="2090880"/>
           </a:xfrm>
           <a:prstGeom prst="rect">
             <a:avLst/>
@@ -1521,7 +1521,7 @@
         <p:spPr>
           <a:xfrm>
             <a:off x="504000" y="301320"/>
-            <a:ext cx="9071280" cy="1261800"/>
+            <a:ext cx="9072000" cy="1261800"/>
           </a:xfrm>
           <a:prstGeom prst="rect">
             <a:avLst/>
@@ -1530,8 +1530,9 @@
         <p:txBody>
           <a:bodyPr lIns="0" rIns="0" tIns="0" bIns="0" anchor="ctr"/>
           <a:p>
+            <a:pPr algn="ctr"/>
             <a:r>
-              <a:rPr b="0" lang="en-US" sz="1800" spc="-1" strike="noStrike">
+              <a:rPr b="0" lang="en-US" sz="4400" spc="-1" strike="noStrike">
                 <a:solidFill>
                   <a:srgbClr val="000000"/>
                 </a:solidFill>
@@ -1544,7 +1545,7 @@
               </a:rPr>
               <a:t>Click to edit the title text format</a:t>
             </a:r>
-            <a:endParaRPr b="0" lang="en-US" sz="1800" spc="-1" strike="noStrike">
+            <a:endParaRPr b="0" lang="en-US" sz="4400" spc="-1" strike="noStrike">
               <a:solidFill>
                 <a:srgbClr val="000000"/>
               </a:solidFill>
@@ -1570,8 +1571,8 @@
         </p:nvSpPr>
         <p:spPr>
           <a:xfrm>
-            <a:off x="504000" y="1769040"/>
-            <a:ext cx="9071280" cy="4384080"/>
+            <a:off x="504000" y="1768680"/>
+            <a:ext cx="9072000" cy="4384080"/>
           </a:xfrm>
           <a:prstGeom prst="rect">
             <a:avLst/>
@@ -1592,7 +1593,7 @@
               <a:buChar char=""/>
             </a:pPr>
             <a:r>
-              <a:rPr b="0" lang="en-US" sz="1800" spc="-1" strike="noStrike">
+              <a:rPr b="0" lang="en-US" sz="3200" spc="-1" strike="noStrike">
                 <a:solidFill>
                   <a:srgbClr val="000000"/>
                 </a:solidFill>
@@ -1605,7 +1606,7 @@
               </a:rPr>
               <a:t>Click to edit the outline text format</a:t>
             </a:r>
-            <a:endParaRPr b="0" lang="en-US" sz="1800" spc="-1" strike="noStrike">
+            <a:endParaRPr b="0" lang="en-US" sz="3200" spc="-1" strike="noStrike">
               <a:solidFill>
                 <a:srgbClr val="000000"/>
               </a:solidFill>
@@ -1630,7 +1631,7 @@
               <a:buChar char=""/>
             </a:pPr>
             <a:r>
-              <a:rPr b="0" lang="en-US" sz="1800" spc="-1" strike="noStrike">
+              <a:rPr b="0" lang="en-US" sz="2800" spc="-1" strike="noStrike">
                 <a:solidFill>
                   <a:srgbClr val="000000"/>
                 </a:solidFill>
@@ -1643,7 +1644,7 @@
               </a:rPr>
               <a:t>Second Outline Level</a:t>
             </a:r>
-            <a:endParaRPr b="0" lang="en-US" sz="1800" spc="-1" strike="noStrike">
+            <a:endParaRPr b="0" lang="en-US" sz="2800" spc="-1" strike="noStrike">
               <a:solidFill>
                 <a:srgbClr val="000000"/>
               </a:solidFill>
@@ -1668,7 +1669,7 @@
               <a:buChar char=""/>
             </a:pPr>
             <a:r>
-              <a:rPr b="0" lang="en-US" sz="1800" spc="-1" strike="noStrike">
+              <a:rPr b="0" lang="en-US" sz="2400" spc="-1" strike="noStrike">
                 <a:solidFill>
                   <a:srgbClr val="000000"/>
                 </a:solidFill>
@@ -1681,7 +1682,7 @@
               </a:rPr>
               <a:t>Third Outline Level</a:t>
             </a:r>
-            <a:endParaRPr b="0" lang="en-US" sz="1800" spc="-1" strike="noStrike">
+            <a:endParaRPr b="0" lang="en-US" sz="2400" spc="-1" strike="noStrike">
               <a:solidFill>
                 <a:srgbClr val="000000"/>
               </a:solidFill>
@@ -1706,7 +1707,7 @@
               <a:buChar char=""/>
             </a:pPr>
             <a:r>
-              <a:rPr b="0" lang="en-US" sz="1800" spc="-1" strike="noStrike">
+              <a:rPr b="0" lang="en-US" sz="2000" spc="-1" strike="noStrike">
                 <a:solidFill>
                   <a:srgbClr val="000000"/>
                 </a:solidFill>
@@ -1719,7 +1720,7 @@
               </a:rPr>
               <a:t>Fourth Outline Level</a:t>
             </a:r>
-            <a:endParaRPr b="0" lang="en-US" sz="1800" spc="-1" strike="noStrike">
+            <a:endParaRPr b="0" lang="en-US" sz="2000" spc="-1" strike="noStrike">
               <a:solidFill>
                 <a:srgbClr val="000000"/>
               </a:solidFill>
@@ -1744,7 +1745,7 @@
               <a:buChar char=""/>
             </a:pPr>
             <a:r>
-              <a:rPr b="0" lang="en-US" sz="1800" spc="-1" strike="noStrike">
+              <a:rPr b="0" lang="en-US" sz="2000" spc="-1" strike="noStrike">
                 <a:solidFill>
                   <a:srgbClr val="000000"/>
                 </a:solidFill>
@@ -1757,7 +1758,7 @@
               </a:rPr>
               <a:t>Fifth Outline Level</a:t>
             </a:r>
-            <a:endParaRPr b="0" lang="en-US" sz="1800" spc="-1" strike="noStrike">
+            <a:endParaRPr b="0" lang="en-US" sz="2000" spc="-1" strike="noStrike">
               <a:solidFill>
                 <a:srgbClr val="000000"/>
               </a:solidFill>
@@ -1782,7 +1783,7 @@
               <a:buChar char=""/>
             </a:pPr>
             <a:r>
-              <a:rPr b="0" lang="en-US" sz="1800" spc="-1" strike="noStrike">
+              <a:rPr b="0" lang="en-US" sz="2000" spc="-1" strike="noStrike">
                 <a:solidFill>
                   <a:srgbClr val="000000"/>
                 </a:solidFill>
@@ -1795,7 +1796,7 @@
               </a:rPr>
               <a:t>Sixth Outline Level</a:t>
             </a:r>
-            <a:endParaRPr b="0" lang="en-US" sz="1800" spc="-1" strike="noStrike">
+            <a:endParaRPr b="0" lang="en-US" sz="2000" spc="-1" strike="noStrike">
               <a:solidFill>
                 <a:srgbClr val="000000"/>
               </a:solidFill>
@@ -1820,7 +1821,7 @@
               <a:buChar char=""/>
             </a:pPr>
             <a:r>
-              <a:rPr b="0" lang="en-US" sz="1800" spc="-1" strike="noStrike">
+              <a:rPr b="0" lang="en-US" sz="2000" spc="-1" strike="noStrike">
                 <a:solidFill>
                   <a:srgbClr val="000000"/>
                 </a:solidFill>
@@ -1833,7 +1834,7 @@
               </a:rPr>
               <a:t>Seventh Outline Level</a:t>
             </a:r>
-            <a:endParaRPr b="0" lang="en-US" sz="1800" spc="-1" strike="noStrike">
+            <a:endParaRPr b="0" lang="en-US" sz="2000" spc="-1" strike="noStrike">
               <a:solidFill>
                 <a:srgbClr val="000000"/>
               </a:solidFill>
@@ -1893,7 +1894,7 @@
         <p:spPr>
           <a:xfrm>
             <a:off x="504000" y="301320"/>
-            <a:ext cx="9071280" cy="1261800"/>
+            <a:ext cx="9070920" cy="1261440"/>
           </a:xfrm>
           <a:prstGeom prst="rect">
             <a:avLst/>
@@ -1928,6 +1929,7 @@
                   </a:solidFill>
                 </a:uFill>
                 <a:latin typeface="Arial"/>
+                <a:ea typeface="DejaVu Sans"/>
               </a:rPr>
               <a:t>EyE Project Status</a:t>
             </a:r>
@@ -1954,7 +1956,7 @@
         <p:spPr>
           <a:xfrm>
             <a:off x="504000" y="1769040"/>
-            <a:ext cx="9071280" cy="4384080"/>
+            <a:ext cx="9070920" cy="4383720"/>
           </a:xfrm>
           <a:prstGeom prst="rect">
             <a:avLst/>
@@ -2057,7 +2059,7 @@
             </a:endParaRPr>
           </a:p>
           <a:p>
-            <a:pPr marL="432000" indent="-323640">
+            <a:pPr marL="432000" indent="-323280">
               <a:lnSpc>
                 <a:spcPct val="100000"/>
               </a:lnSpc>
@@ -2082,6 +2084,7 @@
                   </a:solidFill>
                 </a:uFill>
                 <a:latin typeface="Arial"/>
+                <a:ea typeface="DejaVu Sans"/>
               </a:rPr>
               <a:t>This is the List page.</a:t>
             </a:r>
@@ -2098,7 +2101,7 @@
             </a:endParaRPr>
           </a:p>
           <a:p>
-            <a:pPr marL="432000" indent="-323640">
+            <a:pPr marL="432000" indent="-323280">
               <a:lnSpc>
                 <a:spcPct val="100000"/>
               </a:lnSpc>
@@ -2123,6 +2126,7 @@
                   </a:solidFill>
                 </a:uFill>
                 <a:latin typeface="Arial"/>
+                <a:ea typeface="DejaVu Sans"/>
               </a:rPr>
               <a:t>Click the button “Create”, it will redirect to the add page. </a:t>
             </a:r>
@@ -2153,7 +2157,7 @@
         <p:spPr>
           <a:xfrm>
             <a:off x="2189880" y="2038680"/>
-            <a:ext cx="5307840" cy="1892880"/>
+            <a:ext cx="4119480" cy="1468800"/>
           </a:xfrm>
           <a:prstGeom prst="rect">
             <a:avLst/>
@@ -2171,8 +2175,8 @@
         </p:nvSpPr>
         <p:spPr>
           <a:xfrm rot="21552000">
-            <a:off x="3039480" y="2897640"/>
-            <a:ext cx="1188360" cy="456840"/>
+            <a:off x="2855880" y="2699640"/>
+            <a:ext cx="1047600" cy="365400"/>
           </a:xfrm>
           <a:prstGeom prst="rect">
             <a:avLst/>
@@ -2249,7 +2253,7 @@
         <p:spPr>
           <a:xfrm>
             <a:off x="504000" y="301320"/>
-            <a:ext cx="9071280" cy="1261800"/>
+            <a:ext cx="9070920" cy="1261440"/>
           </a:xfrm>
           <a:prstGeom prst="rect">
             <a:avLst/>
@@ -2284,6 +2288,7 @@
                   </a:solidFill>
                 </a:uFill>
                 <a:latin typeface="Arial"/>
+                <a:ea typeface="DejaVu Sans"/>
               </a:rPr>
               <a:t>Add page</a:t>
             </a:r>
@@ -2310,7 +2315,7 @@
         <p:spPr>
           <a:xfrm>
             <a:off x="504000" y="1769040"/>
-            <a:ext cx="9071280" cy="4814280"/>
+            <a:ext cx="9070920" cy="4813920"/>
           </a:xfrm>
           <a:prstGeom prst="rect">
             <a:avLst/>
@@ -2434,7 +2439,7 @@
             </a:endParaRPr>
           </a:p>
           <a:p>
-            <a:pPr marL="432000" indent="-323640">
+            <a:pPr marL="432000" indent="-323280">
               <a:lnSpc>
                 <a:spcPct val="100000"/>
               </a:lnSpc>
@@ -2459,6 +2464,7 @@
                   </a:solidFill>
                 </a:uFill>
                 <a:latin typeface="Arial"/>
+                <a:ea typeface="DejaVu Sans"/>
               </a:rPr>
               <a:t>Input the information that it needs, and click the button “Submit”, it’ll save the data you input and then redirect to the list page. </a:t>
             </a:r>
@@ -2475,7 +2481,7 @@
             </a:endParaRPr>
           </a:p>
           <a:p>
-            <a:pPr marL="432000" indent="-323640">
+            <a:pPr marL="432000" indent="-323280">
               <a:lnSpc>
                 <a:spcPct val="100000"/>
               </a:lnSpc>
@@ -2500,6 +2506,7 @@
                   </a:solidFill>
                 </a:uFill>
                 <a:latin typeface="Arial"/>
+                <a:ea typeface="DejaVu Sans"/>
               </a:rPr>
               <a:t>If you click the button “Back”, it’ll redirect to list page without saving the data.</a:t>
             </a:r>
@@ -2530,7 +2537,7 @@
         <p:spPr>
           <a:xfrm>
             <a:off x="1616760" y="1704240"/>
-            <a:ext cx="6440400" cy="2742840"/>
+            <a:ext cx="6440040" cy="2742480"/>
           </a:xfrm>
           <a:prstGeom prst="rect">
             <a:avLst/>
@@ -2598,7 +2605,7 @@
         <p:spPr>
           <a:xfrm>
             <a:off x="504000" y="301320"/>
-            <a:ext cx="9071280" cy="1261800"/>
+            <a:ext cx="9070920" cy="1261440"/>
           </a:xfrm>
           <a:prstGeom prst="rect">
             <a:avLst/>
@@ -2633,6 +2640,7 @@
                   </a:solidFill>
                 </a:uFill>
                 <a:latin typeface="Arial"/>
+                <a:ea typeface="DejaVu Sans"/>
               </a:rPr>
               <a:t>Save the data into json file</a:t>
             </a:r>
@@ -2659,7 +2667,7 @@
         <p:spPr>
           <a:xfrm>
             <a:off x="504000" y="1769040"/>
-            <a:ext cx="9071280" cy="4384080"/>
+            <a:ext cx="9070920" cy="4383720"/>
           </a:xfrm>
           <a:prstGeom prst="rect">
             <a:avLst/>
@@ -2783,7 +2791,7 @@
             </a:endParaRPr>
           </a:p>
           <a:p>
-            <a:pPr marL="432000" indent="-323640">
+            <a:pPr marL="432000" indent="-323280">
               <a:lnSpc>
                 <a:spcPct val="100000"/>
               </a:lnSpc>
@@ -2808,6 +2816,7 @@
                   </a:solidFill>
                 </a:uFill>
                 <a:latin typeface="Arial"/>
+                <a:ea typeface="DejaVu Sans"/>
               </a:rPr>
               <a:t>As you can see, the data you input in the add page have been saved into the json file. </a:t>
             </a:r>
@@ -2838,7 +2847,7 @@
         <p:spPr>
           <a:xfrm>
             <a:off x="1352880" y="1932120"/>
-            <a:ext cx="7266960" cy="2639520"/>
+            <a:ext cx="7266600" cy="2639160"/>
           </a:xfrm>
           <a:prstGeom prst="rect">
             <a:avLst/>
@@ -2906,7 +2915,7 @@
         <p:spPr>
           <a:xfrm>
             <a:off x="504000" y="301320"/>
-            <a:ext cx="9071280" cy="1261800"/>
+            <a:ext cx="9070920" cy="1261440"/>
           </a:xfrm>
           <a:prstGeom prst="rect">
             <a:avLst/>
@@ -2941,6 +2950,7 @@
                   </a:solidFill>
                 </a:uFill>
                 <a:latin typeface="Arial"/>
+                <a:ea typeface="DejaVu Sans"/>
               </a:rPr>
               <a:t>Back to list page after “Submit”</a:t>
             </a:r>
@@ -2967,7 +2977,7 @@
         <p:spPr>
           <a:xfrm>
             <a:off x="504000" y="1769040"/>
-            <a:ext cx="9071280" cy="4384080"/>
+            <a:ext cx="9070920" cy="4383720"/>
           </a:xfrm>
           <a:prstGeom prst="rect">
             <a:avLst/>
@@ -3091,7 +3101,7 @@
             </a:endParaRPr>
           </a:p>
           <a:p>
-            <a:pPr marL="432000" indent="-323640">
+            <a:pPr marL="432000" indent="-323280">
               <a:lnSpc>
                 <a:spcPct val="100000"/>
               </a:lnSpc>
@@ -3116,6 +3126,7 @@
                   </a:solidFill>
                 </a:uFill>
                 <a:latin typeface="Arial"/>
+                <a:ea typeface="DejaVu Sans"/>
               </a:rPr>
               <a:t>After “Submit”, it will redirect to list page, and show the latest one message that you input. (In fact, it’s what I want to optimize, the target is: update the list page with all of the data in json file, not show only one)</a:t>
             </a:r>
@@ -3146,7 +3157,7 @@
         <p:spPr>
           <a:xfrm>
             <a:off x="2468880" y="2011680"/>
-            <a:ext cx="4536360" cy="1828440"/>
+            <a:ext cx="4536000" cy="1828080"/>
           </a:xfrm>
           <a:prstGeom prst="rect">
             <a:avLst/>
@@ -3214,7 +3225,7 @@
         <p:spPr>
           <a:xfrm>
             <a:off x="504000" y="301320"/>
-            <a:ext cx="9071280" cy="1261800"/>
+            <a:ext cx="9070920" cy="1261440"/>
           </a:xfrm>
           <a:prstGeom prst="rect">
             <a:avLst/>
@@ -3249,6 +3260,7 @@
                   </a:solidFill>
                 </a:uFill>
                 <a:latin typeface="Arial"/>
+                <a:ea typeface="DejaVu Sans"/>
               </a:rPr>
               <a:t>About the Css Style</a:t>
             </a:r>
@@ -3275,7 +3287,7 @@
         <p:spPr>
           <a:xfrm>
             <a:off x="504000" y="1769040"/>
-            <a:ext cx="9071280" cy="4384080"/>
+            <a:ext cx="9070920" cy="4383720"/>
           </a:xfrm>
           <a:prstGeom prst="rect">
             <a:avLst/>
@@ -3294,7 +3306,7 @@
         <p:txBody>
           <a:bodyPr lIns="0" rIns="0" tIns="0" bIns="0"/>
           <a:p>
-            <a:pPr marL="432000" indent="-323640">
+            <a:pPr marL="432000" indent="-323280">
               <a:lnSpc>
                 <a:spcPct val="100000"/>
               </a:lnSpc>
@@ -3319,6 +3331,7 @@
                   </a:solidFill>
                 </a:uFill>
                 <a:latin typeface="Arial"/>
+                <a:ea typeface="DejaVu Sans"/>
               </a:rPr>
               <a:t>I intend to consider the Css style finally. </a:t>
             </a:r>
@@ -3394,7 +3407,7 @@
         <p:spPr>
           <a:xfrm>
             <a:off x="504000" y="301320"/>
-            <a:ext cx="9071280" cy="1261800"/>
+            <a:ext cx="9070920" cy="1261440"/>
           </a:xfrm>
           <a:prstGeom prst="rect">
             <a:avLst/>
@@ -3429,6 +3442,7 @@
                   </a:solidFill>
                 </a:uFill>
                 <a:latin typeface="Arial"/>
+                <a:ea typeface="DejaVu Sans"/>
               </a:rPr>
               <a:t>Thank you !</a:t>
             </a:r>
@@ -3455,7 +3469,7 @@
         <p:spPr>
           <a:xfrm>
             <a:off x="504000" y="1769040"/>
-            <a:ext cx="9071280" cy="4384080"/>
+            <a:ext cx="9070920" cy="4383720"/>
           </a:xfrm>
           <a:prstGeom prst="rect">
             <a:avLst/>

</xml_diff>